<commit_message>
upload PRESENTACIÓN último detalle
</commit_message>
<xml_diff>
--- a/src/doc/PRESENTACIÓN _Ventas_Online.pptx
+++ b/src/doc/PRESENTACIÓN _Ventas_Online.pptx
@@ -263,7 +263,7 @@
             <a:pPr rtl="0"/>
             <a:fld id="{9DA49006-DE92-401C-BC9A-E01A2E9A55AD}" type="datetime1">
               <a:rPr lang="es-ES" smtClean="0"/>
-              <a:t>21/12/2023</a:t>
+              <a:t>22/12/2023</a:t>
             </a:fld>
             <a:endParaRPr lang="es-ES"/>
           </a:p>
@@ -445,7 +445,7 @@
             <a:fld id="{DEDD2296-4015-4C4F-A06C-A353B4B3F106}" type="datetime1">
               <a:rPr lang="es-ES" smtClean="0"/>
               <a:pPr/>
-              <a:t>21/12/2023</a:t>
+              <a:t>22/12/2023</a:t>
             </a:fld>
             <a:endParaRPr lang="es-ES" dirty="0"/>
           </a:p>
@@ -20695,6 +20695,92 @@
           </a:prstGeom>
         </p:spPr>
       </p:pic>
+      <p:sp>
+        <p:nvSpPr>
+          <p:cNvPr id="3" name="TextBox 2">
+            <a:extLst>
+              <a:ext uri="{FF2B5EF4-FFF2-40B4-BE49-F238E27FC236}">
+                <a16:creationId xmlns:a16="http://schemas.microsoft.com/office/drawing/2014/main" id="{72A35CEA-4EEC-0D5B-5AE5-099AB33F28DA}"/>
+              </a:ext>
+            </a:extLst>
+          </p:cNvPr>
+          <p:cNvSpPr txBox="1"/>
+          <p:nvPr/>
+        </p:nvSpPr>
+        <p:spPr>
+          <a:xfrm>
+            <a:off x="10529228" y="4202558"/>
+            <a:ext cx="1283666" cy="584775"/>
+          </a:xfrm>
+          <a:prstGeom prst="rect">
+            <a:avLst/>
+          </a:prstGeom>
+          <a:noFill/>
+        </p:spPr>
+        <p:txBody>
+          <a:bodyPr wrap="square" rtlCol="0">
+            <a:spAutoFit/>
+          </a:bodyPr>
+          <a:lstStyle/>
+          <a:p>
+            <a:r>
+              <a:rPr lang="es-AR" sz="1600" dirty="0"/>
+              <a:t>Diciembre</a:t>
+            </a:r>
+          </a:p>
+          <a:p>
+            <a:pPr algn="ctr"/>
+            <a:r>
+              <a:rPr lang="es-AR" sz="1600" dirty="0"/>
+              <a:t>2020</a:t>
+            </a:r>
+          </a:p>
+        </p:txBody>
+      </p:sp>
+      <p:cxnSp>
+        <p:nvCxnSpPr>
+          <p:cNvPr id="11" name="Straight Arrow Connector 10">
+            <a:extLst>
+              <a:ext uri="{FF2B5EF4-FFF2-40B4-BE49-F238E27FC236}">
+                <a16:creationId xmlns:a16="http://schemas.microsoft.com/office/drawing/2014/main" id="{AFEED6C7-2909-560E-F841-91CA6A8F93C0}"/>
+              </a:ext>
+            </a:extLst>
+          </p:cNvPr>
+          <p:cNvCxnSpPr>
+            <a:endCxn id="3" idx="0"/>
+          </p:cNvCxnSpPr>
+          <p:nvPr/>
+        </p:nvCxnSpPr>
+        <p:spPr>
+          <a:xfrm>
+            <a:off x="11171061" y="3889494"/>
+            <a:ext cx="0" cy="313064"/>
+          </a:xfrm>
+          <a:prstGeom prst="straightConnector1">
+            <a:avLst/>
+          </a:prstGeom>
+          <a:ln>
+            <a:solidFill>
+              <a:schemeClr val="tx1"/>
+            </a:solidFill>
+            <a:tailEnd type="triangle"/>
+          </a:ln>
+        </p:spPr>
+        <p:style>
+          <a:lnRef idx="1">
+            <a:schemeClr val="accent1"/>
+          </a:lnRef>
+          <a:fillRef idx="0">
+            <a:schemeClr val="accent1"/>
+          </a:fillRef>
+          <a:effectRef idx="0">
+            <a:schemeClr val="accent1"/>
+          </a:effectRef>
+          <a:fontRef idx="minor">
+            <a:schemeClr val="tx1"/>
+          </a:fontRef>
+        </p:style>
+      </p:cxnSp>
     </p:spTree>
     <p:extLst>
       <p:ext uri="{BB962C8B-B14F-4D97-AF65-F5344CB8AC3E}">
@@ -30961,6 +31047,91 @@
           </a:prstGeom>
         </p:spPr>
       </p:pic>
+      <p:sp>
+        <p:nvSpPr>
+          <p:cNvPr id="3" name="TextBox 2">
+            <a:extLst>
+              <a:ext uri="{FF2B5EF4-FFF2-40B4-BE49-F238E27FC236}">
+                <a16:creationId xmlns:a16="http://schemas.microsoft.com/office/drawing/2014/main" id="{FEFC7C6F-41CC-34DA-99ED-CD2FB3CCE72E}"/>
+              </a:ext>
+            </a:extLst>
+          </p:cNvPr>
+          <p:cNvSpPr txBox="1"/>
+          <p:nvPr/>
+        </p:nvSpPr>
+        <p:spPr>
+          <a:xfrm>
+            <a:off x="10562284" y="4350936"/>
+            <a:ext cx="1119330" cy="584775"/>
+          </a:xfrm>
+          <a:prstGeom prst="rect">
+            <a:avLst/>
+          </a:prstGeom>
+          <a:noFill/>
+        </p:spPr>
+        <p:txBody>
+          <a:bodyPr wrap="square" rtlCol="0">
+            <a:spAutoFit/>
+          </a:bodyPr>
+          <a:lstStyle/>
+          <a:p>
+            <a:r>
+              <a:rPr lang="es-AR" sz="1600" dirty="0"/>
+              <a:t>Móviles </a:t>
+            </a:r>
+          </a:p>
+          <a:p>
+            <a:r>
+              <a:rPr lang="es-AR" sz="1600" dirty="0"/>
+              <a:t>y Tablets</a:t>
+            </a:r>
+          </a:p>
+        </p:txBody>
+      </p:sp>
+      <p:cxnSp>
+        <p:nvCxnSpPr>
+          <p:cNvPr id="11" name="Straight Arrow Connector 10">
+            <a:extLst>
+              <a:ext uri="{FF2B5EF4-FFF2-40B4-BE49-F238E27FC236}">
+                <a16:creationId xmlns:a16="http://schemas.microsoft.com/office/drawing/2014/main" id="{07F99DAD-5B13-CE64-40BD-D41B34445D2B}"/>
+              </a:ext>
+            </a:extLst>
+          </p:cNvPr>
+          <p:cNvCxnSpPr>
+            <a:cxnSpLocks/>
+          </p:cNvCxnSpPr>
+          <p:nvPr/>
+        </p:nvCxnSpPr>
+        <p:spPr>
+          <a:xfrm>
+            <a:off x="11080552" y="3985959"/>
+            <a:ext cx="0" cy="384524"/>
+          </a:xfrm>
+          <a:prstGeom prst="straightConnector1">
+            <a:avLst/>
+          </a:prstGeom>
+          <a:ln>
+            <a:solidFill>
+              <a:schemeClr val="tx1"/>
+            </a:solidFill>
+            <a:tailEnd type="triangle"/>
+          </a:ln>
+        </p:spPr>
+        <p:style>
+          <a:lnRef idx="1">
+            <a:schemeClr val="accent1"/>
+          </a:lnRef>
+          <a:fillRef idx="0">
+            <a:schemeClr val="accent1"/>
+          </a:fillRef>
+          <a:effectRef idx="0">
+            <a:schemeClr val="accent1"/>
+          </a:effectRef>
+          <a:fontRef idx="minor">
+            <a:schemeClr val="tx1"/>
+          </a:fontRef>
+        </p:style>
+      </p:cxnSp>
     </p:spTree>
     <p:extLst>
       <p:ext uri="{BB962C8B-B14F-4D97-AF65-F5344CB8AC3E}">
@@ -33508,6 +33679,15 @@
 </file>
 
 <file path=customXml/item1.xml><?xml version="1.0" encoding="utf-8"?>
+<?mso-contentType ?>
+<FormTemplates xmlns="http://schemas.microsoft.com/sharepoint/v3/contenttype/forms">
+  <Display>DocumentLibraryForm</Display>
+  <Edit>DocumentLibraryForm</Edit>
+  <New>DocumentLibraryForm</New>
+</FormTemplates>
+</file>
+
+<file path=customXml/item2.xml><?xml version="1.0" encoding="utf-8"?>
 <ct:contentTypeSchema xmlns:ct="http://schemas.microsoft.com/office/2006/metadata/contentType" xmlns:ma="http://schemas.microsoft.com/office/2006/metadata/properties/metaAttributes" ct:_="" ma:_="" ma:contentTypeName="Document" ma:contentTypeID="0x01010079F111ED35F8CC479449609E8A0923A6" ma:contentTypeVersion="20" ma:contentTypeDescription="Create a new document." ma:contentTypeScope="" ma:versionID="1267097ee5f5874adfcc408041ae252e">
   <xsd:schema xmlns:xsd="http://www.w3.org/2001/XMLSchema" xmlns:xs="http://www.w3.org/2001/XMLSchema" xmlns:p="http://schemas.microsoft.com/office/2006/metadata/properties" xmlns:ns1="http://schemas.microsoft.com/sharepoint/v3" xmlns:ns2="71af3243-3dd4-4a8d-8c0d-dd76da1f02a5" xmlns:ns3="16c05727-aa75-4e4a-9b5f-8a80a1165891" xmlns:ns4="230e9df3-be65-4c73-a93b-d1236ebd677e" targetNamespace="http://schemas.microsoft.com/office/2006/metadata/properties" ma:root="true" ma:fieldsID="395891a93df65b14727750f2c06c306c" ns1:_="" ns2:_="" ns3:_="" ns4:_="">
     <xsd:import namespace="http://schemas.microsoft.com/sharepoint/v3"/>
@@ -33783,15 +33963,6 @@
 </ct:contentTypeSchema>
 </file>
 
-<file path=customXml/item2.xml><?xml version="1.0" encoding="utf-8"?>
-<?mso-contentType ?>
-<FormTemplates xmlns="http://schemas.microsoft.com/sharepoint/v3/contenttype/forms">
-  <Display>DocumentLibraryForm</Display>
-  <Edit>DocumentLibraryForm</Edit>
-  <New>DocumentLibraryForm</New>
-</FormTemplates>
-</file>
-
 <file path=customXml/item3.xml><?xml version="1.0" encoding="utf-8"?>
 <p:properties xmlns:p="http://schemas.microsoft.com/office/2006/metadata/properties" xmlns:xsi="http://www.w3.org/2001/XMLSchema-instance" xmlns:pc="http://schemas.microsoft.com/office/infopath/2007/PartnerControls">
   <documentManagement>
@@ -33812,6 +33983,14 @@
 </file>
 
 <file path=customXml/itemProps1.xml><?xml version="1.0" encoding="utf-8"?>
+<ds:datastoreItem xmlns:ds="http://schemas.openxmlformats.org/officeDocument/2006/customXml" ds:itemID="{2D446390-8521-40A2-A462-EA068123BED9}">
+  <ds:schemaRefs>
+    <ds:schemaRef ds:uri="http://schemas.microsoft.com/sharepoint/v3/contenttype/forms"/>
+  </ds:schemaRefs>
+</ds:datastoreItem>
+</file>
+
+<file path=customXml/itemProps2.xml><?xml version="1.0" encoding="utf-8"?>
 <ds:datastoreItem xmlns:ds="http://schemas.openxmlformats.org/officeDocument/2006/customXml" ds:itemID="{01E84A1C-2814-43A7-9448-348326113A45}">
   <ds:schemaRefs>
     <ds:schemaRef ds:uri="http://schemas.microsoft.com/office/2006/metadata/contentType"/>
@@ -33828,14 +34007,6 @@
     <ds:schemaRef ds:uri="http://purl.org/dc/elements/1.1/"/>
     <ds:schemaRef ds:uri="http://purl.org/dc/terms/"/>
     <ds:schemaRef ds:uri="http://schemas.microsoft.com/internal/obd"/>
-  </ds:schemaRefs>
-</ds:datastoreItem>
-</file>
-
-<file path=customXml/itemProps2.xml><?xml version="1.0" encoding="utf-8"?>
-<ds:datastoreItem xmlns:ds="http://schemas.openxmlformats.org/officeDocument/2006/customXml" ds:itemID="{2D446390-8521-40A2-A462-EA068123BED9}">
-  <ds:schemaRefs>
-    <ds:schemaRef ds:uri="http://schemas.microsoft.com/sharepoint/v3/contenttype/forms"/>
   </ds:schemaRefs>
 </ds:datastoreItem>
 </file>

</xml_diff>